<commit_message>
My intro slides from first course
</commit_message>
<xml_diff>
--- a/slides-by-us/Intro-FoE-2023-24.pptx
+++ b/slides-by-us/Intro-FoE-2023-24.pptx
@@ -5,7 +5,7 @@
     <p:sldMasterId id="2147483648" r:id="rId1"/>
   </p:sldMasterIdLst>
   <p:notesMasterIdLst>
-    <p:notesMasterId r:id="rId15"/>
+    <p:notesMasterId r:id="rId16"/>
   </p:notesMasterIdLst>
   <p:sldIdLst>
     <p:sldId id="257" r:id="rId2"/>
@@ -19,8 +19,9 @@
     <p:sldId id="267" r:id="rId10"/>
     <p:sldId id="274" r:id="rId11"/>
     <p:sldId id="272" r:id="rId12"/>
-    <p:sldId id="273" r:id="rId13"/>
-    <p:sldId id="269" r:id="rId14"/>
+    <p:sldId id="280" r:id="rId13"/>
+    <p:sldId id="273" r:id="rId14"/>
+    <p:sldId id="269" r:id="rId15"/>
   </p:sldIdLst>
   <p:sldSz cx="9144000" cy="5715000" type="screen16x10"/>
   <p:notesSz cx="6858000" cy="9144000"/>
@@ -220,7 +221,7 @@
           <a:p>
             <a:fld id="{19C334B4-43C6-47FF-AFC7-2EEDB0EE66F7}" type="datetimeFigureOut">
               <a:rPr lang="en-US" smtClean="0"/>
-              <a:t>2023-10-11</a:t>
+              <a:t>2023-10-12</a:t>
             </a:fld>
             <a:endParaRPr lang="en-US"/>
           </a:p>
@@ -837,7 +838,7 @@
           <a:p>
             <a:fld id="{08C46021-58C3-4E5D-8BBB-4314F2568516}" type="datetime1">
               <a:rPr lang="en-US" smtClean="0"/>
-              <a:t>2023-10-11</a:t>
+              <a:t>2023-10-12</a:t>
             </a:fld>
             <a:endParaRPr lang="en-US"/>
           </a:p>
@@ -1002,7 +1003,7 @@
           <a:p>
             <a:fld id="{B77CF43D-0ED1-4F29-8E1D-57BE7B33A4CE}" type="datetime1">
               <a:rPr lang="en-US" smtClean="0"/>
-              <a:t>2023-10-11</a:t>
+              <a:t>2023-10-12</a:t>
             </a:fld>
             <a:endParaRPr lang="en-US"/>
           </a:p>
@@ -1177,7 +1178,7 @@
           <a:p>
             <a:fld id="{7942BCD8-AC7F-41EA-AADA-21D27CA8744F}" type="datetime1">
               <a:rPr lang="en-US" smtClean="0"/>
-              <a:t>2023-10-11</a:t>
+              <a:t>2023-10-12</a:t>
             </a:fld>
             <a:endParaRPr lang="en-US"/>
           </a:p>
@@ -1342,7 +1343,7 @@
           <a:p>
             <a:fld id="{E93AB0D8-CAA7-4329-BBEE-2722B0535505}" type="datetime1">
               <a:rPr lang="en-US" smtClean="0"/>
-              <a:t>2023-10-11</a:t>
+              <a:t>2023-10-12</a:t>
             </a:fld>
             <a:endParaRPr lang="en-US"/>
           </a:p>
@@ -1583,7 +1584,7 @@
           <a:p>
             <a:fld id="{C3DBB950-6BB1-4F84-8BB1-8261E03229D7}" type="datetime1">
               <a:rPr lang="en-US" smtClean="0"/>
-              <a:t>2023-10-11</a:t>
+              <a:t>2023-10-12</a:t>
             </a:fld>
             <a:endParaRPr lang="en-US"/>
           </a:p>
@@ -1866,7 +1867,7 @@
           <a:p>
             <a:fld id="{C7C43E42-D0E6-44FB-B701-FD74B390060D}" type="datetime1">
               <a:rPr lang="en-US" smtClean="0"/>
-              <a:t>2023-10-11</a:t>
+              <a:t>2023-10-12</a:t>
             </a:fld>
             <a:endParaRPr lang="en-US"/>
           </a:p>
@@ -2283,7 +2284,7 @@
           <a:p>
             <a:fld id="{785372E4-3D07-4C00-BCD2-0C4366E79F13}" type="datetime1">
               <a:rPr lang="en-US" smtClean="0"/>
-              <a:t>2023-10-11</a:t>
+              <a:t>2023-10-12</a:t>
             </a:fld>
             <a:endParaRPr lang="en-US"/>
           </a:p>
@@ -2396,7 +2397,7 @@
           <a:p>
             <a:fld id="{1AE57863-361C-4082-9348-6A60EAF4CF78}" type="datetime1">
               <a:rPr lang="en-US" smtClean="0"/>
-              <a:t>2023-10-11</a:t>
+              <a:t>2023-10-12</a:t>
             </a:fld>
             <a:endParaRPr lang="en-US"/>
           </a:p>
@@ -2486,7 +2487,7 @@
           <a:p>
             <a:fld id="{20AEC4AD-9339-4E3E-BA65-ACDE4A64233E}" type="datetime1">
               <a:rPr lang="en-US" smtClean="0"/>
-              <a:t>2023-10-11</a:t>
+              <a:t>2023-10-12</a:t>
             </a:fld>
             <a:endParaRPr lang="en-US"/>
           </a:p>
@@ -2758,7 +2759,7 @@
           <a:p>
             <a:fld id="{4D703CB3-1185-4EB7-94FC-026336EF999E}" type="datetime1">
               <a:rPr lang="en-US" smtClean="0"/>
-              <a:t>2023-10-11</a:t>
+              <a:t>2023-10-12</a:t>
             </a:fld>
             <a:endParaRPr lang="en-US"/>
           </a:p>
@@ -3006,7 +3007,7 @@
           <a:p>
             <a:fld id="{25AC0514-54E2-464B-829E-09FA4B9C1B21}" type="datetime1">
               <a:rPr lang="en-US" smtClean="0"/>
-              <a:t>2023-10-11</a:t>
+              <a:t>2023-10-12</a:t>
             </a:fld>
             <a:endParaRPr lang="en-US"/>
           </a:p>
@@ -3214,7 +3215,7 @@
           <a:p>
             <a:fld id="{7B1F7E12-C93A-4B3A-BC88-E4170706B5A5}" type="datetime1">
               <a:rPr lang="en-US" smtClean="0"/>
-              <a:t>2023-10-11</a:t>
+              <a:t>2023-10-12</a:t>
             </a:fld>
             <a:endParaRPr lang="en-US"/>
           </a:p>
@@ -3652,15 +3653,7 @@
                   <a:schemeClr val="tx2"/>
                 </a:solidFill>
               </a:rPr>
-              <a:t>Winter 2023/24 </a:t>
-            </a:r>
-            <a:r>
-              <a:rPr lang="en-US" sz="2800" b="1" dirty="0" smtClean="0">
-                <a:solidFill>
-                  <a:schemeClr val="tx2"/>
-                </a:solidFill>
-              </a:rPr>
-              <a:t>@ Ruhr Uni Bochum</a:t>
+              <a:t>Winter 2023/24 @ Ruhr Uni Bochum</a:t>
             </a:r>
             <a:endParaRPr lang="en-US" sz="4400" b="1" dirty="0">
               <a:solidFill>
@@ -4028,34 +4021,44 @@
               <a:rPr lang="en-US" sz="2400" b="1" dirty="0" smtClean="0"/>
               <a:t>New time: Wednesday at 14:15-15:45</a:t>
             </a:r>
-            <a:endParaRPr lang="en-US" sz="2734" b="1" dirty="0" smtClean="0"/>
           </a:p>
           <a:p>
             <a:r>
               <a:rPr lang="en-US" sz="2400" dirty="0" smtClean="0"/>
-              <a:t>You can come </a:t>
+              <a:t>Same room as </a:t>
+            </a:r>
+            <a:r>
+              <a:rPr lang="en-US" sz="2400" dirty="0"/>
+              <a:t>the course </a:t>
             </a:r>
             <a:r>
               <a:rPr lang="en-US" sz="2400" dirty="0" smtClean="0"/>
-              <a:t>ask </a:t>
+              <a:t>(MB</a:t>
+            </a:r>
+            <a:r>
+              <a:rPr lang="en-US" sz="2400" dirty="0"/>
+              <a:t>, </a:t>
             </a:r>
             <a:r>
               <a:rPr lang="en-US" sz="2400" dirty="0" smtClean="0"/>
-              <a:t>questions</a:t>
-            </a:r>
+              <a:t>flour </a:t>
+            </a:r>
+            <a:r>
+              <a:rPr lang="en-US" sz="2400" dirty="0"/>
+              <a:t>5, room SM-MO-506)</a:t>
+            </a:r>
+            <a:endParaRPr lang="en-US" sz="2734" dirty="0" smtClean="0"/>
           </a:p>
           <a:p>
             <a:r>
               <a:rPr lang="en-US" sz="2400" dirty="0" smtClean="0"/>
-              <a:t>You can also </a:t>
-            </a:r>
+              <a:t>You can come ask questions</a:t>
+            </a:r>
+          </a:p>
+          <a:p>
             <a:r>
               <a:rPr lang="en-US" sz="2400" dirty="0" smtClean="0"/>
-              <a:t>come work </a:t>
-            </a:r>
-            <a:r>
-              <a:rPr lang="en-US" sz="2400" dirty="0" smtClean="0"/>
-              <a:t>on your own during tutorials</a:t>
+              <a:t>You can also come work on your own during tutorials</a:t>
             </a:r>
           </a:p>
           <a:p>
@@ -4130,332 +4133,7 @@
   <p:timing>
     <p:tnLst>
       <p:par>
-        <p:cTn id="1" dur="indefinite" restart="never" nodeType="tmRoot">
-          <p:childTnLst>
-            <p:seq concurrent="1" nextAc="seek">
-              <p:cTn id="2" dur="indefinite" nodeType="mainSeq">
-                <p:childTnLst>
-                  <p:par>
-                    <p:cTn id="3" fill="hold">
-                      <p:stCondLst>
-                        <p:cond delay="indefinite"/>
-                      </p:stCondLst>
-                      <p:childTnLst>
-                        <p:par>
-                          <p:cTn id="4" fill="hold">
-                            <p:stCondLst>
-                              <p:cond delay="0"/>
-                            </p:stCondLst>
-                            <p:childTnLst>
-                              <p:par>
-                                <p:cTn id="5" presetID="1" presetClass="entr" presetSubtype="0" fill="hold" nodeType="clickEffect">
-                                  <p:stCondLst>
-                                    <p:cond delay="0"/>
-                                  </p:stCondLst>
-                                  <p:childTnLst>
-                                    <p:set>
-                                      <p:cBhvr>
-                                        <p:cTn id="6" dur="1" fill="hold">
-                                          <p:stCondLst>
-                                            <p:cond delay="0"/>
-                                          </p:stCondLst>
-                                        </p:cTn>
-                                        <p:tgtEl>
-                                          <p:spTgt spid="3">
-                                            <p:txEl>
-                                              <p:pRg st="0" end="0"/>
-                                            </p:txEl>
-                                          </p:spTgt>
-                                        </p:tgtEl>
-                                        <p:attrNameLst>
-                                          <p:attrName>style.visibility</p:attrName>
-                                        </p:attrNameLst>
-                                      </p:cBhvr>
-                                      <p:to>
-                                        <p:strVal val="visible"/>
-                                      </p:to>
-                                    </p:set>
-                                  </p:childTnLst>
-                                </p:cTn>
-                              </p:par>
-                            </p:childTnLst>
-                          </p:cTn>
-                        </p:par>
-                      </p:childTnLst>
-                    </p:cTn>
-                  </p:par>
-                  <p:par>
-                    <p:cTn id="7" fill="hold">
-                      <p:stCondLst>
-                        <p:cond delay="indefinite"/>
-                      </p:stCondLst>
-                      <p:childTnLst>
-                        <p:par>
-                          <p:cTn id="8" fill="hold">
-                            <p:stCondLst>
-                              <p:cond delay="0"/>
-                            </p:stCondLst>
-                            <p:childTnLst>
-                              <p:par>
-                                <p:cTn id="9" presetID="1" presetClass="entr" presetSubtype="0" fill="hold" nodeType="clickEffect">
-                                  <p:stCondLst>
-                                    <p:cond delay="0"/>
-                                  </p:stCondLst>
-                                  <p:childTnLst>
-                                    <p:set>
-                                      <p:cBhvr>
-                                        <p:cTn id="10" dur="1" fill="hold">
-                                          <p:stCondLst>
-                                            <p:cond delay="0"/>
-                                          </p:stCondLst>
-                                        </p:cTn>
-                                        <p:tgtEl>
-                                          <p:spTgt spid="3">
-                                            <p:txEl>
-                                              <p:pRg st="1" end="1"/>
-                                            </p:txEl>
-                                          </p:spTgt>
-                                        </p:tgtEl>
-                                        <p:attrNameLst>
-                                          <p:attrName>style.visibility</p:attrName>
-                                        </p:attrNameLst>
-                                      </p:cBhvr>
-                                      <p:to>
-                                        <p:strVal val="visible"/>
-                                      </p:to>
-                                    </p:set>
-                                  </p:childTnLst>
-                                </p:cTn>
-                              </p:par>
-                            </p:childTnLst>
-                          </p:cTn>
-                        </p:par>
-                      </p:childTnLst>
-                    </p:cTn>
-                  </p:par>
-                  <p:par>
-                    <p:cTn id="11" fill="hold">
-                      <p:stCondLst>
-                        <p:cond delay="indefinite"/>
-                      </p:stCondLst>
-                      <p:childTnLst>
-                        <p:par>
-                          <p:cTn id="12" fill="hold">
-                            <p:stCondLst>
-                              <p:cond delay="0"/>
-                            </p:stCondLst>
-                            <p:childTnLst>
-                              <p:par>
-                                <p:cTn id="13" presetID="1" presetClass="entr" presetSubtype="0" fill="hold" nodeType="clickEffect">
-                                  <p:stCondLst>
-                                    <p:cond delay="0"/>
-                                  </p:stCondLst>
-                                  <p:childTnLst>
-                                    <p:set>
-                                      <p:cBhvr>
-                                        <p:cTn id="14" dur="1" fill="hold">
-                                          <p:stCondLst>
-                                            <p:cond delay="0"/>
-                                          </p:stCondLst>
-                                        </p:cTn>
-                                        <p:tgtEl>
-                                          <p:spTgt spid="3">
-                                            <p:txEl>
-                                              <p:pRg st="2" end="2"/>
-                                            </p:txEl>
-                                          </p:spTgt>
-                                        </p:tgtEl>
-                                        <p:attrNameLst>
-                                          <p:attrName>style.visibility</p:attrName>
-                                        </p:attrNameLst>
-                                      </p:cBhvr>
-                                      <p:to>
-                                        <p:strVal val="visible"/>
-                                      </p:to>
-                                    </p:set>
-                                  </p:childTnLst>
-                                </p:cTn>
-                              </p:par>
-                              <p:par>
-                                <p:cTn id="15" presetID="1" presetClass="entr" presetSubtype="0" fill="hold" nodeType="withEffect">
-                                  <p:stCondLst>
-                                    <p:cond delay="0"/>
-                                  </p:stCondLst>
-                                  <p:childTnLst>
-                                    <p:set>
-                                      <p:cBhvr>
-                                        <p:cTn id="16" dur="1" fill="hold">
-                                          <p:stCondLst>
-                                            <p:cond delay="0"/>
-                                          </p:stCondLst>
-                                        </p:cTn>
-                                        <p:tgtEl>
-                                          <p:spTgt spid="3">
-                                            <p:txEl>
-                                              <p:pRg st="3" end="3"/>
-                                            </p:txEl>
-                                          </p:spTgt>
-                                        </p:tgtEl>
-                                        <p:attrNameLst>
-                                          <p:attrName>style.visibility</p:attrName>
-                                        </p:attrNameLst>
-                                      </p:cBhvr>
-                                      <p:to>
-                                        <p:strVal val="visible"/>
-                                      </p:to>
-                                    </p:set>
-                                  </p:childTnLst>
-                                </p:cTn>
-                              </p:par>
-                              <p:par>
-                                <p:cTn id="17" presetID="1" presetClass="entr" presetSubtype="0" fill="hold" nodeType="withEffect">
-                                  <p:stCondLst>
-                                    <p:cond delay="0"/>
-                                  </p:stCondLst>
-                                  <p:childTnLst>
-                                    <p:set>
-                                      <p:cBhvr>
-                                        <p:cTn id="18" dur="1" fill="hold">
-                                          <p:stCondLst>
-                                            <p:cond delay="0"/>
-                                          </p:stCondLst>
-                                        </p:cTn>
-                                        <p:tgtEl>
-                                          <p:spTgt spid="3">
-                                            <p:txEl>
-                                              <p:pRg st="4" end="4"/>
-                                            </p:txEl>
-                                          </p:spTgt>
-                                        </p:tgtEl>
-                                        <p:attrNameLst>
-                                          <p:attrName>style.visibility</p:attrName>
-                                        </p:attrNameLst>
-                                      </p:cBhvr>
-                                      <p:to>
-                                        <p:strVal val="visible"/>
-                                      </p:to>
-                                    </p:set>
-                                  </p:childTnLst>
-                                </p:cTn>
-                              </p:par>
-                              <p:par>
-                                <p:cTn id="19" presetID="1" presetClass="entr" presetSubtype="0" fill="hold" nodeType="withEffect">
-                                  <p:stCondLst>
-                                    <p:cond delay="0"/>
-                                  </p:stCondLst>
-                                  <p:childTnLst>
-                                    <p:set>
-                                      <p:cBhvr>
-                                        <p:cTn id="20" dur="1" fill="hold">
-                                          <p:stCondLst>
-                                            <p:cond delay="0"/>
-                                          </p:stCondLst>
-                                        </p:cTn>
-                                        <p:tgtEl>
-                                          <p:spTgt spid="3">
-                                            <p:txEl>
-                                              <p:pRg st="5" end="5"/>
-                                            </p:txEl>
-                                          </p:spTgt>
-                                        </p:tgtEl>
-                                        <p:attrNameLst>
-                                          <p:attrName>style.visibility</p:attrName>
-                                        </p:attrNameLst>
-                                      </p:cBhvr>
-                                      <p:to>
-                                        <p:strVal val="visible"/>
-                                      </p:to>
-                                    </p:set>
-                                  </p:childTnLst>
-                                </p:cTn>
-                              </p:par>
-                              <p:par>
-                                <p:cTn id="21" presetID="1" presetClass="entr" presetSubtype="0" fill="hold" nodeType="withEffect">
-                                  <p:stCondLst>
-                                    <p:cond delay="0"/>
-                                  </p:stCondLst>
-                                  <p:childTnLst>
-                                    <p:set>
-                                      <p:cBhvr>
-                                        <p:cTn id="22" dur="1" fill="hold">
-                                          <p:stCondLst>
-                                            <p:cond delay="0"/>
-                                          </p:stCondLst>
-                                        </p:cTn>
-                                        <p:tgtEl>
-                                          <p:spTgt spid="3">
-                                            <p:txEl>
-                                              <p:pRg st="6" end="6"/>
-                                            </p:txEl>
-                                          </p:spTgt>
-                                        </p:tgtEl>
-                                        <p:attrNameLst>
-                                          <p:attrName>style.visibility</p:attrName>
-                                        </p:attrNameLst>
-                                      </p:cBhvr>
-                                      <p:to>
-                                        <p:strVal val="visible"/>
-                                      </p:to>
-                                    </p:set>
-                                  </p:childTnLst>
-                                </p:cTn>
-                              </p:par>
-                              <p:par>
-                                <p:cTn id="23" presetID="1" presetClass="entr" presetSubtype="0" fill="hold" nodeType="withEffect">
-                                  <p:stCondLst>
-                                    <p:cond delay="0"/>
-                                  </p:stCondLst>
-                                  <p:childTnLst>
-                                    <p:set>
-                                      <p:cBhvr>
-                                        <p:cTn id="24" dur="1" fill="hold">
-                                          <p:stCondLst>
-                                            <p:cond delay="0"/>
-                                          </p:stCondLst>
-                                        </p:cTn>
-                                        <p:tgtEl>
-                                          <p:spTgt spid="3">
-                                            <p:txEl>
-                                              <p:pRg st="7" end="7"/>
-                                            </p:txEl>
-                                          </p:spTgt>
-                                        </p:tgtEl>
-                                        <p:attrNameLst>
-                                          <p:attrName>style.visibility</p:attrName>
-                                        </p:attrNameLst>
-                                      </p:cBhvr>
-                                      <p:to>
-                                        <p:strVal val="visible"/>
-                                      </p:to>
-                                    </p:set>
-                                  </p:childTnLst>
-                                </p:cTn>
-                              </p:par>
-                            </p:childTnLst>
-                          </p:cTn>
-                        </p:par>
-                      </p:childTnLst>
-                    </p:cTn>
-                  </p:par>
-                </p:childTnLst>
-              </p:cTn>
-              <p:prevCondLst>
-                <p:cond evt="onPrev" delay="0">
-                  <p:tgtEl>
-                    <p:sldTgt/>
-                  </p:tgtEl>
-                </p:cond>
-              </p:prevCondLst>
-              <p:nextCondLst>
-                <p:cond evt="onNext" delay="0">
-                  <p:tgtEl>
-                    <p:sldTgt/>
-                  </p:tgtEl>
-                </p:cond>
-              </p:nextCondLst>
-            </p:seq>
-          </p:childTnLst>
-        </p:cTn>
+        <p:cTn id="1" dur="indefinite" restart="never" nodeType="tmRoot"/>
       </p:par>
     </p:tnLst>
   </p:timing>
@@ -4517,7 +4195,12 @@
             <p:ph sz="half" idx="1"/>
           </p:nvPr>
         </p:nvSpPr>
-        <p:spPr/>
+        <p:spPr>
+          <a:xfrm>
+            <a:off x="457200" y="876300"/>
+            <a:ext cx="4038600" cy="3771636"/>
+          </a:xfrm>
+        </p:spPr>
         <p:txBody>
           <a:bodyPr/>
           <a:lstStyle/>
@@ -4595,7 +4278,12 @@
             <p:ph sz="half" idx="2"/>
           </p:nvPr>
         </p:nvSpPr>
-        <p:spPr/>
+        <p:spPr>
+          <a:xfrm>
+            <a:off x="4648200" y="876300"/>
+            <a:ext cx="4038600" cy="3771636"/>
+          </a:xfrm>
+        </p:spPr>
         <p:txBody>
           <a:bodyPr/>
           <a:lstStyle/>
@@ -4644,25 +4332,15 @@
             <a:pPr lvl="1"/>
             <a:r>
               <a:rPr lang="en-US" dirty="0" smtClean="0"/>
-              <a:t>date: </a:t>
-            </a:r>
+              <a:t>date: 21 February</a:t>
+            </a:r>
+          </a:p>
+          <a:p>
+            <a:pPr lvl="1"/>
             <a:r>
               <a:rPr lang="en-US" dirty="0" smtClean="0"/>
-              <a:t>21 February</a:t>
-            </a:r>
-            <a:endParaRPr lang="en-US" dirty="0" smtClean="0"/>
-          </a:p>
-          <a:p>
-            <a:pPr lvl="1"/>
-            <a:r>
-              <a:rPr lang="en-US" dirty="0" smtClean="0"/>
-              <a:t>re-exam</a:t>
-            </a:r>
-            <a:r>
-              <a:rPr lang="en-US" dirty="0" smtClean="0"/>
-              <a:t>: 22 March</a:t>
-            </a:r>
-            <a:endParaRPr lang="en-US" dirty="0" smtClean="0"/>
+              <a:t>re-exam: 22 March</a:t>
+            </a:r>
           </a:p>
           <a:p>
             <a:pPr lvl="1"/>
@@ -4710,475 +4388,9 @@
   <p:timing>
     <p:tnLst>
       <p:par>
-        <p:cTn id="1" dur="indefinite" restart="never" nodeType="tmRoot">
-          <p:childTnLst>
-            <p:seq concurrent="1" nextAc="seek">
-              <p:cTn id="2" dur="indefinite" nodeType="mainSeq">
-                <p:childTnLst>
-                  <p:par>
-                    <p:cTn id="3" fill="hold">
-                      <p:stCondLst>
-                        <p:cond delay="indefinite"/>
-                      </p:stCondLst>
-                      <p:childTnLst>
-                        <p:par>
-                          <p:cTn id="4" fill="hold">
-                            <p:stCondLst>
-                              <p:cond delay="0"/>
-                            </p:stCondLst>
-                            <p:childTnLst>
-                              <p:par>
-                                <p:cTn id="5" presetID="1" presetClass="entr" presetSubtype="0" fill="hold" grpId="0" nodeType="clickEffect">
-                                  <p:stCondLst>
-                                    <p:cond delay="0"/>
-                                  </p:stCondLst>
-                                  <p:childTnLst>
-                                    <p:set>
-                                      <p:cBhvr>
-                                        <p:cTn id="6" dur="1" fill="hold">
-                                          <p:stCondLst>
-                                            <p:cond delay="0"/>
-                                          </p:stCondLst>
-                                        </p:cTn>
-                                        <p:tgtEl>
-                                          <p:spTgt spid="10">
-                                            <p:txEl>
-                                              <p:pRg st="0" end="0"/>
-                                            </p:txEl>
-                                          </p:spTgt>
-                                        </p:tgtEl>
-                                        <p:attrNameLst>
-                                          <p:attrName>style.visibility</p:attrName>
-                                        </p:attrNameLst>
-                                      </p:cBhvr>
-                                      <p:to>
-                                        <p:strVal val="visible"/>
-                                      </p:to>
-                                    </p:set>
-                                  </p:childTnLst>
-                                </p:cTn>
-                              </p:par>
-                              <p:par>
-                                <p:cTn id="7" presetID="1" presetClass="entr" presetSubtype="0" fill="hold" grpId="0" nodeType="withEffect">
-                                  <p:stCondLst>
-                                    <p:cond delay="0"/>
-                                  </p:stCondLst>
-                                  <p:childTnLst>
-                                    <p:set>
-                                      <p:cBhvr>
-                                        <p:cTn id="8" dur="1" fill="hold">
-                                          <p:stCondLst>
-                                            <p:cond delay="0"/>
-                                          </p:stCondLst>
-                                        </p:cTn>
-                                        <p:tgtEl>
-                                          <p:spTgt spid="10">
-                                            <p:txEl>
-                                              <p:pRg st="1" end="1"/>
-                                            </p:txEl>
-                                          </p:spTgt>
-                                        </p:tgtEl>
-                                        <p:attrNameLst>
-                                          <p:attrName>style.visibility</p:attrName>
-                                        </p:attrNameLst>
-                                      </p:cBhvr>
-                                      <p:to>
-                                        <p:strVal val="visible"/>
-                                      </p:to>
-                                    </p:set>
-                                  </p:childTnLst>
-                                </p:cTn>
-                              </p:par>
-                              <p:par>
-                                <p:cTn id="9" presetID="1" presetClass="entr" presetSubtype="0" fill="hold" grpId="0" nodeType="withEffect">
-                                  <p:stCondLst>
-                                    <p:cond delay="0"/>
-                                  </p:stCondLst>
-                                  <p:childTnLst>
-                                    <p:set>
-                                      <p:cBhvr>
-                                        <p:cTn id="10" dur="1" fill="hold">
-                                          <p:stCondLst>
-                                            <p:cond delay="0"/>
-                                          </p:stCondLst>
-                                        </p:cTn>
-                                        <p:tgtEl>
-                                          <p:spTgt spid="10">
-                                            <p:txEl>
-                                              <p:pRg st="2" end="2"/>
-                                            </p:txEl>
-                                          </p:spTgt>
-                                        </p:tgtEl>
-                                        <p:attrNameLst>
-                                          <p:attrName>style.visibility</p:attrName>
-                                        </p:attrNameLst>
-                                      </p:cBhvr>
-                                      <p:to>
-                                        <p:strVal val="visible"/>
-                                      </p:to>
-                                    </p:set>
-                                  </p:childTnLst>
-                                </p:cTn>
-                              </p:par>
-                              <p:par>
-                                <p:cTn id="11" presetID="1" presetClass="entr" presetSubtype="0" fill="hold" grpId="0" nodeType="withEffect">
-                                  <p:stCondLst>
-                                    <p:cond delay="0"/>
-                                  </p:stCondLst>
-                                  <p:childTnLst>
-                                    <p:set>
-                                      <p:cBhvr>
-                                        <p:cTn id="12" dur="1" fill="hold">
-                                          <p:stCondLst>
-                                            <p:cond delay="0"/>
-                                          </p:stCondLst>
-                                        </p:cTn>
-                                        <p:tgtEl>
-                                          <p:spTgt spid="10">
-                                            <p:txEl>
-                                              <p:pRg st="3" end="3"/>
-                                            </p:txEl>
-                                          </p:spTgt>
-                                        </p:tgtEl>
-                                        <p:attrNameLst>
-                                          <p:attrName>style.visibility</p:attrName>
-                                        </p:attrNameLst>
-                                      </p:cBhvr>
-                                      <p:to>
-                                        <p:strVal val="visible"/>
-                                      </p:to>
-                                    </p:set>
-                                  </p:childTnLst>
-                                </p:cTn>
-                              </p:par>
-                              <p:par>
-                                <p:cTn id="13" presetID="1" presetClass="entr" presetSubtype="0" fill="hold" grpId="0" nodeType="withEffect">
-                                  <p:stCondLst>
-                                    <p:cond delay="0"/>
-                                  </p:stCondLst>
-                                  <p:childTnLst>
-                                    <p:set>
-                                      <p:cBhvr>
-                                        <p:cTn id="14" dur="1" fill="hold">
-                                          <p:stCondLst>
-                                            <p:cond delay="0"/>
-                                          </p:stCondLst>
-                                        </p:cTn>
-                                        <p:tgtEl>
-                                          <p:spTgt spid="10">
-                                            <p:txEl>
-                                              <p:pRg st="4" end="4"/>
-                                            </p:txEl>
-                                          </p:spTgt>
-                                        </p:tgtEl>
-                                        <p:attrNameLst>
-                                          <p:attrName>style.visibility</p:attrName>
-                                        </p:attrNameLst>
-                                      </p:cBhvr>
-                                      <p:to>
-                                        <p:strVal val="visible"/>
-                                      </p:to>
-                                    </p:set>
-                                  </p:childTnLst>
-                                </p:cTn>
-                              </p:par>
-                              <p:par>
-                                <p:cTn id="15" presetID="1" presetClass="entr" presetSubtype="0" fill="hold" grpId="0" nodeType="withEffect">
-                                  <p:stCondLst>
-                                    <p:cond delay="0"/>
-                                  </p:stCondLst>
-                                  <p:childTnLst>
-                                    <p:set>
-                                      <p:cBhvr>
-                                        <p:cTn id="16" dur="1" fill="hold">
-                                          <p:stCondLst>
-                                            <p:cond delay="0"/>
-                                          </p:stCondLst>
-                                        </p:cTn>
-                                        <p:tgtEl>
-                                          <p:spTgt spid="10">
-                                            <p:txEl>
-                                              <p:pRg st="5" end="5"/>
-                                            </p:txEl>
-                                          </p:spTgt>
-                                        </p:tgtEl>
-                                        <p:attrNameLst>
-                                          <p:attrName>style.visibility</p:attrName>
-                                        </p:attrNameLst>
-                                      </p:cBhvr>
-                                      <p:to>
-                                        <p:strVal val="visible"/>
-                                      </p:to>
-                                    </p:set>
-                                  </p:childTnLst>
-                                </p:cTn>
-                              </p:par>
-                              <p:par>
-                                <p:cTn id="17" presetID="1" presetClass="entr" presetSubtype="0" fill="hold" grpId="0" nodeType="withEffect">
-                                  <p:stCondLst>
-                                    <p:cond delay="0"/>
-                                  </p:stCondLst>
-                                  <p:childTnLst>
-                                    <p:set>
-                                      <p:cBhvr>
-                                        <p:cTn id="18" dur="1" fill="hold">
-                                          <p:stCondLst>
-                                            <p:cond delay="0"/>
-                                          </p:stCondLst>
-                                        </p:cTn>
-                                        <p:tgtEl>
-                                          <p:spTgt spid="10">
-                                            <p:txEl>
-                                              <p:pRg st="6" end="6"/>
-                                            </p:txEl>
-                                          </p:spTgt>
-                                        </p:tgtEl>
-                                        <p:attrNameLst>
-                                          <p:attrName>style.visibility</p:attrName>
-                                        </p:attrNameLst>
-                                      </p:cBhvr>
-                                      <p:to>
-                                        <p:strVal val="visible"/>
-                                      </p:to>
-                                    </p:set>
-                                  </p:childTnLst>
-                                </p:cTn>
-                              </p:par>
-                            </p:childTnLst>
-                          </p:cTn>
-                        </p:par>
-                      </p:childTnLst>
-                    </p:cTn>
-                  </p:par>
-                  <p:par>
-                    <p:cTn id="19" fill="hold">
-                      <p:stCondLst>
-                        <p:cond delay="indefinite"/>
-                      </p:stCondLst>
-                      <p:childTnLst>
-                        <p:par>
-                          <p:cTn id="20" fill="hold">
-                            <p:stCondLst>
-                              <p:cond delay="0"/>
-                            </p:stCondLst>
-                            <p:childTnLst>
-                              <p:par>
-                                <p:cTn id="21" presetID="1" presetClass="entr" presetSubtype="0" fill="hold" grpId="0" nodeType="clickEffect">
-                                  <p:stCondLst>
-                                    <p:cond delay="0"/>
-                                  </p:stCondLst>
-                                  <p:childTnLst>
-                                    <p:set>
-                                      <p:cBhvr>
-                                        <p:cTn id="22" dur="1" fill="hold">
-                                          <p:stCondLst>
-                                            <p:cond delay="0"/>
-                                          </p:stCondLst>
-                                        </p:cTn>
-                                        <p:tgtEl>
-                                          <p:spTgt spid="9">
-                                            <p:txEl>
-                                              <p:pRg st="0" end="0"/>
-                                            </p:txEl>
-                                          </p:spTgt>
-                                        </p:tgtEl>
-                                        <p:attrNameLst>
-                                          <p:attrName>style.visibility</p:attrName>
-                                        </p:attrNameLst>
-                                      </p:cBhvr>
-                                      <p:to>
-                                        <p:strVal val="visible"/>
-                                      </p:to>
-                                    </p:set>
-                                  </p:childTnLst>
-                                </p:cTn>
-                              </p:par>
-                              <p:par>
-                                <p:cTn id="23" presetID="1" presetClass="entr" presetSubtype="0" fill="hold" grpId="0" nodeType="withEffect">
-                                  <p:stCondLst>
-                                    <p:cond delay="0"/>
-                                  </p:stCondLst>
-                                  <p:childTnLst>
-                                    <p:set>
-                                      <p:cBhvr>
-                                        <p:cTn id="24" dur="1" fill="hold">
-                                          <p:stCondLst>
-                                            <p:cond delay="0"/>
-                                          </p:stCondLst>
-                                        </p:cTn>
-                                        <p:tgtEl>
-                                          <p:spTgt spid="9">
-                                            <p:txEl>
-                                              <p:pRg st="1" end="1"/>
-                                            </p:txEl>
-                                          </p:spTgt>
-                                        </p:tgtEl>
-                                        <p:attrNameLst>
-                                          <p:attrName>style.visibility</p:attrName>
-                                        </p:attrNameLst>
-                                      </p:cBhvr>
-                                      <p:to>
-                                        <p:strVal val="visible"/>
-                                      </p:to>
-                                    </p:set>
-                                  </p:childTnLst>
-                                </p:cTn>
-                              </p:par>
-                              <p:par>
-                                <p:cTn id="25" presetID="1" presetClass="entr" presetSubtype="0" fill="hold" grpId="0" nodeType="withEffect">
-                                  <p:stCondLst>
-                                    <p:cond delay="0"/>
-                                  </p:stCondLst>
-                                  <p:childTnLst>
-                                    <p:set>
-                                      <p:cBhvr>
-                                        <p:cTn id="26" dur="1" fill="hold">
-                                          <p:stCondLst>
-                                            <p:cond delay="0"/>
-                                          </p:stCondLst>
-                                        </p:cTn>
-                                        <p:tgtEl>
-                                          <p:spTgt spid="9">
-                                            <p:txEl>
-                                              <p:pRg st="2" end="2"/>
-                                            </p:txEl>
-                                          </p:spTgt>
-                                        </p:tgtEl>
-                                        <p:attrNameLst>
-                                          <p:attrName>style.visibility</p:attrName>
-                                        </p:attrNameLst>
-                                      </p:cBhvr>
-                                      <p:to>
-                                        <p:strVal val="visible"/>
-                                      </p:to>
-                                    </p:set>
-                                  </p:childTnLst>
-                                </p:cTn>
-                              </p:par>
-                              <p:par>
-                                <p:cTn id="27" presetID="1" presetClass="entr" presetSubtype="0" fill="hold" grpId="0" nodeType="withEffect">
-                                  <p:stCondLst>
-                                    <p:cond delay="0"/>
-                                  </p:stCondLst>
-                                  <p:childTnLst>
-                                    <p:set>
-                                      <p:cBhvr>
-                                        <p:cTn id="28" dur="1" fill="hold">
-                                          <p:stCondLst>
-                                            <p:cond delay="0"/>
-                                          </p:stCondLst>
-                                        </p:cTn>
-                                        <p:tgtEl>
-                                          <p:spTgt spid="9">
-                                            <p:txEl>
-                                              <p:pRg st="3" end="3"/>
-                                            </p:txEl>
-                                          </p:spTgt>
-                                        </p:tgtEl>
-                                        <p:attrNameLst>
-                                          <p:attrName>style.visibility</p:attrName>
-                                        </p:attrNameLst>
-                                      </p:cBhvr>
-                                      <p:to>
-                                        <p:strVal val="visible"/>
-                                      </p:to>
-                                    </p:set>
-                                  </p:childTnLst>
-                                </p:cTn>
-                              </p:par>
-                              <p:par>
-                                <p:cTn id="29" presetID="1" presetClass="entr" presetSubtype="0" fill="hold" grpId="0" nodeType="withEffect">
-                                  <p:stCondLst>
-                                    <p:cond delay="0"/>
-                                  </p:stCondLst>
-                                  <p:childTnLst>
-                                    <p:set>
-                                      <p:cBhvr>
-                                        <p:cTn id="30" dur="1" fill="hold">
-                                          <p:stCondLst>
-                                            <p:cond delay="0"/>
-                                          </p:stCondLst>
-                                        </p:cTn>
-                                        <p:tgtEl>
-                                          <p:spTgt spid="9">
-                                            <p:txEl>
-                                              <p:pRg st="4" end="4"/>
-                                            </p:txEl>
-                                          </p:spTgt>
-                                        </p:tgtEl>
-                                        <p:attrNameLst>
-                                          <p:attrName>style.visibility</p:attrName>
-                                        </p:attrNameLst>
-                                      </p:cBhvr>
-                                      <p:to>
-                                        <p:strVal val="visible"/>
-                                      </p:to>
-                                    </p:set>
-                                  </p:childTnLst>
-                                </p:cTn>
-                              </p:par>
-                              <p:par>
-                                <p:cTn id="31" presetID="1" presetClass="entr" presetSubtype="0" fill="hold" grpId="0" nodeType="withEffect">
-                                  <p:stCondLst>
-                                    <p:cond delay="0"/>
-                                  </p:stCondLst>
-                                  <p:childTnLst>
-                                    <p:set>
-                                      <p:cBhvr>
-                                        <p:cTn id="32" dur="1" fill="hold">
-                                          <p:stCondLst>
-                                            <p:cond delay="0"/>
-                                          </p:stCondLst>
-                                        </p:cTn>
-                                        <p:tgtEl>
-                                          <p:spTgt spid="9">
-                                            <p:txEl>
-                                              <p:pRg st="5" end="5"/>
-                                            </p:txEl>
-                                          </p:spTgt>
-                                        </p:tgtEl>
-                                        <p:attrNameLst>
-                                          <p:attrName>style.visibility</p:attrName>
-                                        </p:attrNameLst>
-                                      </p:cBhvr>
-                                      <p:to>
-                                        <p:strVal val="visible"/>
-                                      </p:to>
-                                    </p:set>
-                                  </p:childTnLst>
-                                </p:cTn>
-                              </p:par>
-                            </p:childTnLst>
-                          </p:cTn>
-                        </p:par>
-                      </p:childTnLst>
-                    </p:cTn>
-                  </p:par>
-                </p:childTnLst>
-              </p:cTn>
-              <p:prevCondLst>
-                <p:cond evt="onPrev" delay="0">
-                  <p:tgtEl>
-                    <p:sldTgt/>
-                  </p:tgtEl>
-                </p:cond>
-              </p:prevCondLst>
-              <p:nextCondLst>
-                <p:cond evt="onNext" delay="0">
-                  <p:tgtEl>
-                    <p:sldTgt/>
-                  </p:tgtEl>
-                </p:cond>
-              </p:nextCondLst>
-            </p:seq>
-          </p:childTnLst>
-        </p:cTn>
+        <p:cTn id="1" dur="indefinite" restart="never" nodeType="tmRoot"/>
       </p:par>
     </p:tnLst>
-    <p:bldLst>
-      <p:bldP spid="9" grpId="0" build="p"/>
-      <p:bldP spid="10" grpId="0" build="p"/>
-    </p:bldLst>
   </p:timing>
 </p:sld>
 </file>
@@ -5202,6 +4414,178 @@
       </p:grpSpPr>
       <p:sp>
         <p:nvSpPr>
+          <p:cNvPr id="6" name="Title 5"/>
+          <p:cNvSpPr>
+            <a:spLocks noGrp="1"/>
+          </p:cNvSpPr>
+          <p:nvPr>
+            <p:ph type="title"/>
+          </p:nvPr>
+        </p:nvSpPr>
+        <p:spPr>
+          <a:xfrm>
+            <a:off x="457200" y="76200"/>
+            <a:ext cx="8229600" cy="952500"/>
+          </a:xfrm>
+        </p:spPr>
+        <p:txBody>
+          <a:bodyPr/>
+          <a:lstStyle/>
+          <a:p>
+            <a:r>
+              <a:rPr lang="en-US" b="1" dirty="0" smtClean="0"/>
+              <a:t>Early final exam registration?</a:t>
+            </a:r>
+            <a:endParaRPr lang="en-US" b="1" dirty="0"/>
+          </a:p>
+        </p:txBody>
+      </p:sp>
+      <p:sp>
+        <p:nvSpPr>
+          <p:cNvPr id="7" name="Content Placeholder 6"/>
+          <p:cNvSpPr>
+            <a:spLocks noGrp="1"/>
+          </p:cNvSpPr>
+          <p:nvPr>
+            <p:ph idx="1"/>
+          </p:nvPr>
+        </p:nvSpPr>
+        <p:spPr>
+          <a:xfrm>
+            <a:off x="457200" y="1181100"/>
+            <a:ext cx="8229600" cy="3771636"/>
+          </a:xfrm>
+        </p:spPr>
+        <p:txBody>
+          <a:bodyPr>
+            <a:noAutofit/>
+          </a:bodyPr>
+          <a:lstStyle/>
+          <a:p>
+            <a:r>
+              <a:rPr lang="en-US" sz="2400" dirty="0" smtClean="0"/>
+              <a:t>A week ago the CS examination office informed us that </a:t>
+            </a:r>
+            <a:r>
+              <a:rPr lang="en-US" sz="2400" dirty="0"/>
+              <a:t>a new policy will apply to </a:t>
+            </a:r>
+            <a:r>
+              <a:rPr lang="en-US" sz="2400" dirty="0" smtClean="0"/>
+              <a:t>us, since our course has exercises during the semester:</a:t>
+            </a:r>
+          </a:p>
+          <a:p>
+            <a:pPr lvl="1"/>
+            <a:r>
+              <a:rPr lang="en-US" sz="2000" dirty="0" smtClean="0"/>
+              <a:t>Students who want to get credit points would need to register by Monday, 23 October (so soon!)</a:t>
+            </a:r>
+          </a:p>
+          <a:p>
+            <a:r>
+              <a:rPr lang="en-US" sz="2400" dirty="0" smtClean="0"/>
+              <a:t>To me this seems like a bad idea</a:t>
+            </a:r>
+          </a:p>
+          <a:p>
+            <a:pPr lvl="1"/>
+            <a:r>
+              <a:rPr lang="en-US" sz="2000" dirty="0" smtClean="0"/>
+              <a:t>Giving students less freedom in choosing courses</a:t>
+            </a:r>
+          </a:p>
+          <a:p>
+            <a:pPr lvl="1"/>
+            <a:r>
+              <a:rPr lang="en-US" sz="2000" dirty="0" smtClean="0"/>
+              <a:t>Making our courses less appealing to students who are not sure</a:t>
+            </a:r>
+            <a:br>
+              <a:rPr lang="en-US" sz="2000" dirty="0" smtClean="0"/>
+            </a:br>
+            <a:r>
+              <a:rPr lang="en-US" sz="2000" dirty="0" smtClean="0"/>
+              <a:t>from the beginning whether this course is for them or not?</a:t>
+            </a:r>
+          </a:p>
+          <a:p>
+            <a:r>
+              <a:rPr lang="en-US" sz="2400" dirty="0" smtClean="0"/>
+              <a:t>Discussing with examination office later this week</a:t>
+            </a:r>
+          </a:p>
+          <a:p>
+            <a:r>
+              <a:rPr lang="en-US" sz="2400" dirty="0" smtClean="0"/>
+              <a:t>Please let me know what you think</a:t>
+            </a:r>
+            <a:endParaRPr lang="en-US" sz="2400" dirty="0"/>
+          </a:p>
+        </p:txBody>
+      </p:sp>
+      <p:sp>
+        <p:nvSpPr>
+          <p:cNvPr id="5" name="Slide Number Placeholder 4"/>
+          <p:cNvSpPr>
+            <a:spLocks noGrp="1"/>
+          </p:cNvSpPr>
+          <p:nvPr>
+            <p:ph type="sldNum" sz="quarter" idx="12"/>
+          </p:nvPr>
+        </p:nvSpPr>
+        <p:spPr/>
+        <p:txBody>
+          <a:bodyPr/>
+          <a:lstStyle/>
+          <a:p>
+            <a:fld id="{93E3BA9C-1FBB-4D46-B089-AB487B58273B}" type="slidenum">
+              <a:rPr lang="en-US" smtClean="0"/>
+              <a:t>12</a:t>
+            </a:fld>
+            <a:endParaRPr lang="en-US"/>
+          </a:p>
+        </p:txBody>
+      </p:sp>
+    </p:spTree>
+    <p:extLst>
+      <p:ext uri="{BB962C8B-B14F-4D97-AF65-F5344CB8AC3E}">
+        <p14:creationId xmlns:p14="http://schemas.microsoft.com/office/powerpoint/2010/main" val="4170028537"/>
+      </p:ext>
+    </p:extLst>
+  </p:cSld>
+  <p:clrMapOvr>
+    <a:masterClrMapping/>
+  </p:clrMapOvr>
+  <p:timing>
+    <p:tnLst>
+      <p:par>
+        <p:cTn id="1" dur="indefinite" restart="never" nodeType="tmRoot"/>
+      </p:par>
+    </p:tnLst>
+  </p:timing>
+</p:sld>
+</file>
+
+<file path=ppt/slides/slide13.xml><?xml version="1.0" encoding="utf-8"?>
+<p:sld xmlns:a="http://schemas.openxmlformats.org/drawingml/2006/main" xmlns:r="http://schemas.openxmlformats.org/officeDocument/2006/relationships" xmlns:p="http://schemas.openxmlformats.org/presentationml/2006/main">
+  <p:cSld>
+    <p:spTree>
+      <p:nvGrpSpPr>
+        <p:cNvPr id="1" name=""/>
+        <p:cNvGrpSpPr/>
+        <p:nvPr/>
+      </p:nvGrpSpPr>
+      <p:grpSpPr>
+        <a:xfrm>
+          <a:off x="0" y="0"/>
+          <a:ext cx="0" cy="0"/>
+          <a:chOff x="0" y="0"/>
+          <a:chExt cx="0" cy="0"/>
+        </a:xfrm>
+      </p:grpSpPr>
+      <p:sp>
+        <p:nvSpPr>
           <p:cNvPr id="2" name="Title 1"/>
           <p:cNvSpPr>
             <a:spLocks noGrp="1"/>
@@ -5245,7 +4629,7 @@
           <a:p>
             <a:fld id="{93E3BA9C-1FBB-4D46-B089-AB487B58273B}" type="slidenum">
               <a:rPr lang="en-US" smtClean="0"/>
-              <a:t>12</a:t>
+              <a:t>13</a:t>
             </a:fld>
             <a:endParaRPr lang="en-US" dirty="0"/>
           </a:p>
@@ -6154,11 +5538,7 @@
             </a:r>
             <a:r>
               <a:rPr lang="en-US" b="1" dirty="0" smtClean="0"/>
-              <a:t>to pass and get </a:t>
-            </a:r>
-            <a:r>
-              <a:rPr lang="en-US" b="1" dirty="0" smtClean="0"/>
-              <a:t>credit + attending final exam(!)</a:t>
+              <a:t>to pass and get credit + attending final exam(!)</a:t>
             </a:r>
             <a:endParaRPr lang="en-US" b="1" dirty="0"/>
           </a:p>
@@ -6196,11 +5576,7 @@
             </a:r>
             <a:r>
               <a:rPr lang="en-US" b="1" dirty="0" smtClean="0"/>
-              <a:t>to get </a:t>
-            </a:r>
-            <a:r>
-              <a:rPr lang="en-US" b="1" dirty="0" smtClean="0"/>
-              <a:t>maximum grade</a:t>
+              <a:t>to get maximum grade</a:t>
             </a:r>
             <a:endParaRPr lang="en-US" b="1" dirty="0"/>
           </a:p>
@@ -6422,13 +5798,13 @@
           <a:p>
             <a:r>
               <a:rPr lang="en-US" sz="2000" dirty="0" smtClean="0"/>
-              <a:t>Computer Science BSc (soon MSc too)</a:t>
+              <a:t>Computer Science MSc</a:t>
             </a:r>
           </a:p>
           <a:p>
             <a:r>
               <a:rPr lang="en-US" sz="2000" dirty="0" smtClean="0"/>
-              <a:t>IT Security BSc and MSc</a:t>
+              <a:t>IT Security MSc</a:t>
             </a:r>
           </a:p>
           <a:p>
@@ -7556,7 +6932,7 @@
 </p:sld>
 </file>
 
-<file path=ppt/slides/slide13.xml><?xml version="1.0" encoding="utf-8"?>
+<file path=ppt/slides/slide14.xml><?xml version="1.0" encoding="utf-8"?>
 <p:sld xmlns:a="http://schemas.openxmlformats.org/drawingml/2006/main" xmlns:r="http://schemas.openxmlformats.org/officeDocument/2006/relationships" xmlns:p="http://schemas.openxmlformats.org/presentationml/2006/main">
   <p:cSld>
     <p:spTree>
@@ -7601,23 +6977,15 @@
               </a:lnSpc>
             </a:pPr>
             <a:r>
-              <a:rPr lang="en-US" sz="2800" b="1" dirty="0" smtClean="0">
+              <a:rPr lang="en-US" sz="3200" b="1" dirty="0" smtClean="0">
                 <a:solidFill>
                   <a:srgbClr val="C00000"/>
                 </a:solidFill>
               </a:rPr>
-              <a:t>Considering prequel </a:t>
-            </a:r>
-            <a:r>
-              <a:rPr lang="en-US" sz="2800" b="1" dirty="0" smtClean="0">
-                <a:solidFill>
-                  <a:srgbClr val="C00000"/>
-                </a:solidFill>
-              </a:rPr>
-              <a:t>course</a:t>
-            </a:r>
-            <a:r>
-              <a:rPr lang="en-US" sz="2800" dirty="0" smtClean="0">
+              <a:t>Considering prequel course</a:t>
+            </a:r>
+            <a:r>
+              <a:rPr lang="en-US" sz="3200" dirty="0" smtClean="0">
                 <a:solidFill>
                   <a:srgbClr val="C00000"/>
                 </a:solidFill>
@@ -7625,7 +6993,7 @@
               <a:t> (next semester?)</a:t>
             </a:r>
             <a:br>
-              <a:rPr lang="en-US" sz="2800" dirty="0" smtClean="0">
+              <a:rPr lang="en-US" sz="3200" dirty="0" smtClean="0">
                 <a:solidFill>
                   <a:srgbClr val="C00000"/>
                 </a:solidFill>
@@ -7736,7 +7104,7 @@
           <a:p>
             <a:fld id="{93E3BA9C-1FBB-4D46-B089-AB487B58273B}" type="slidenum">
               <a:rPr lang="en-US" smtClean="0"/>
-              <a:t>13</a:t>
+              <a:t>14</a:t>
             </a:fld>
             <a:endParaRPr lang="en-US"/>
           </a:p>
@@ -7764,8 +7132,8 @@
         </p:blipFill>
         <p:spPr>
           <a:xfrm>
-            <a:off x="7692817" y="495300"/>
-            <a:ext cx="1679783" cy="1679448"/>
+            <a:off x="7921463" y="723900"/>
+            <a:ext cx="1451137" cy="1450848"/>
           </a:xfrm>
           <a:prstGeom prst="rect">
             <a:avLst/>
@@ -7920,15 +7288,7 @@
             <a:pPr lvl="1"/>
             <a:r>
               <a:rPr lang="en-US" sz="2066" dirty="0" smtClean="0"/>
-              <a:t>Hoare </a:t>
-            </a:r>
-            <a:r>
-              <a:rPr lang="en-US" sz="2066" dirty="0" smtClean="0"/>
-              <a:t>Logic: </a:t>
-            </a:r>
-            <a:r>
-              <a:rPr lang="en-US" sz="2066" dirty="0" smtClean="0"/>
-              <a:t>verify Imp programs</a:t>
+              <a:t>Hoare Logic: verify Imp programs</a:t>
             </a:r>
           </a:p>
           <a:p>
@@ -7941,7 +7301,6 @@
               <a:rPr lang="en-US" sz="2066" dirty="0" smtClean="0"/>
               <a:t>Logic (RHL)</a:t>
             </a:r>
-            <a:endParaRPr lang="en-US" sz="2066" dirty="0" smtClean="0"/>
           </a:p>
           <a:p>
             <a:r>
@@ -7972,11 +7331,7 @@
             </a:r>
             <a:r>
               <a:rPr lang="en-US" sz="1733" dirty="0" smtClean="0"/>
-              <a:t>, </a:t>
-            </a:r>
-            <a:r>
-              <a:rPr lang="en-US" sz="1733" dirty="0" smtClean="0"/>
-              <a:t>cryptographic </a:t>
+              <a:t>, cryptographic </a:t>
             </a:r>
             <a:r>
               <a:rPr lang="en-US" sz="1733" dirty="0"/>
@@ -8514,15 +7869,7 @@
           <a:p>
             <a:r>
               <a:rPr lang="en-US" sz="2800" b="1" dirty="0" smtClean="0"/>
-              <a:t>Textbook written in Coq; our </a:t>
-            </a:r>
-            <a:r>
-              <a:rPr lang="en-US" sz="2800" b="1" dirty="0" smtClean="0"/>
-              <a:t>extended version </a:t>
-            </a:r>
-            <a:r>
-              <a:rPr lang="en-US" sz="2800" b="1" dirty="0" smtClean="0"/>
-              <a:t>at:</a:t>
+              <a:t>Textbook written in Coq; our extended version at:</a:t>
             </a:r>
             <a:r>
               <a:rPr lang="en-US" sz="3200" b="1" dirty="0"/>
@@ -8619,75 +7966,7 @@
   <p:timing>
     <p:tnLst>
       <p:par>
-        <p:cTn id="1" dur="indefinite" restart="never" nodeType="tmRoot">
-          <p:childTnLst>
-            <p:seq concurrent="1" nextAc="seek">
-              <p:cTn id="2" dur="indefinite" nodeType="mainSeq">
-                <p:childTnLst>
-                  <p:par>
-                    <p:cTn id="3" fill="hold">
-                      <p:stCondLst>
-                        <p:cond delay="indefinite"/>
-                      </p:stCondLst>
-                      <p:childTnLst>
-                        <p:par>
-                          <p:cTn id="4" fill="hold">
-                            <p:stCondLst>
-                              <p:cond delay="0"/>
-                            </p:stCondLst>
-                            <p:childTnLst>
-                              <p:par>
-                                <p:cTn id="5" presetID="1" presetClass="entr" presetSubtype="0" fill="hold" nodeType="clickEffect">
-                                  <p:stCondLst>
-                                    <p:cond delay="0"/>
-                                  </p:stCondLst>
-                                  <p:childTnLst>
-                                    <p:set>
-                                      <p:cBhvr>
-                                        <p:cTn id="6" dur="1" fill="hold">
-                                          <p:stCondLst>
-                                            <p:cond delay="0"/>
-                                          </p:stCondLst>
-                                        </p:cTn>
-                                        <p:tgtEl>
-                                          <p:spTgt spid="6"/>
-                                        </p:tgtEl>
-                                        <p:attrNameLst>
-                                          <p:attrName>style.visibility</p:attrName>
-                                        </p:attrNameLst>
-                                      </p:cBhvr>
-                                      <p:to>
-                                        <p:strVal val="visible"/>
-                                      </p:to>
-                                    </p:set>
-                                  </p:childTnLst>
-                                </p:cTn>
-                              </p:par>
-                            </p:childTnLst>
-                          </p:cTn>
-                        </p:par>
-                      </p:childTnLst>
-                    </p:cTn>
-                  </p:par>
-                </p:childTnLst>
-              </p:cTn>
-              <p:prevCondLst>
-                <p:cond evt="onPrev" delay="0">
-                  <p:tgtEl>
-                    <p:sldTgt/>
-                  </p:tgtEl>
-                </p:cond>
-              </p:prevCondLst>
-              <p:nextCondLst>
-                <p:cond evt="onNext" delay="0">
-                  <p:tgtEl>
-                    <p:sldTgt/>
-                  </p:tgtEl>
-                </p:cond>
-              </p:nextCondLst>
-            </p:seq>
-          </p:childTnLst>
-        </p:cTn>
+        <p:cTn id="1" dur="indefinite" restart="never" nodeType="tmRoot"/>
       </p:par>
     </p:tnLst>
   </p:timing>
@@ -8838,15 +8117,7 @@
                   <a:srgbClr val="C00000"/>
                 </a:solidFill>
               </a:rPr>
-              <a:t>Using the Coq proof </a:t>
-            </a:r>
-            <a:r>
-              <a:rPr lang="en-US" sz="3200" b="1" dirty="0" smtClean="0">
-                <a:solidFill>
-                  <a:srgbClr val="C00000"/>
-                </a:solidFill>
-              </a:rPr>
-              <a:t>assistant</a:t>
+              <a:t>Using the Coq proof assistant</a:t>
             </a:r>
           </a:p>
           <a:p>
@@ -8998,103 +8269,9 @@
                                         <p:tgtEl>
                                           <p:spTgt spid="3">
                                             <p:txEl>
-                                              <p:pRg st="3" end="3"/>
-                                            </p:txEl>
-                                          </p:spTgt>
-                                        </p:tgtEl>
-                                        <p:attrNameLst>
-                                          <p:attrName>style.visibility</p:attrName>
-                                        </p:attrNameLst>
-                                      </p:cBhvr>
-                                      <p:to>
-                                        <p:strVal val="visible"/>
-                                      </p:to>
-                                    </p:set>
-                                  </p:childTnLst>
-                                </p:cTn>
-                              </p:par>
-                            </p:childTnLst>
-                          </p:cTn>
-                        </p:par>
-                      </p:childTnLst>
-                    </p:cTn>
-                  </p:par>
-                  <p:par>
-                    <p:cTn id="7" fill="hold">
-                      <p:stCondLst>
-                        <p:cond delay="indefinite"/>
-                      </p:stCondLst>
-                      <p:childTnLst>
-                        <p:par>
-                          <p:cTn id="8" fill="hold">
-                            <p:stCondLst>
-                              <p:cond delay="0"/>
-                            </p:stCondLst>
-                            <p:childTnLst>
-                              <p:par>
-                                <p:cTn id="9" presetID="1" presetClass="entr" presetSubtype="0" fill="hold" nodeType="clickEffect">
-                                  <p:stCondLst>
-                                    <p:cond delay="0"/>
-                                  </p:stCondLst>
-                                  <p:childTnLst>
-                                    <p:set>
-                                      <p:cBhvr>
-                                        <p:cTn id="10" dur="1" fill="hold">
-                                          <p:stCondLst>
-                                            <p:cond delay="0"/>
-                                          </p:stCondLst>
-                                        </p:cTn>
-                                        <p:tgtEl>
-                                          <p:spTgt spid="3">
-                                            <p:txEl>
                                               <p:pRg st="4" end="4"/>
                                             </p:txEl>
                                           </p:spTgt>
-                                        </p:tgtEl>
-                                        <p:attrNameLst>
-                                          <p:attrName>style.visibility</p:attrName>
-                                        </p:attrNameLst>
-                                      </p:cBhvr>
-                                      <p:to>
-                                        <p:strVal val="visible"/>
-                                      </p:to>
-                                    </p:set>
-                                  </p:childTnLst>
-                                </p:cTn>
-                              </p:par>
-                            </p:childTnLst>
-                          </p:cTn>
-                        </p:par>
-                      </p:childTnLst>
-                    </p:cTn>
-                  </p:par>
-                  <p:par>
-                    <p:cTn id="11" fill="hold">
-                      <p:stCondLst>
-                        <p:cond delay="indefinite"/>
-                      </p:stCondLst>
-                      <p:childTnLst>
-                        <p:par>
-                          <p:cTn id="12" fill="hold">
-                            <p:stCondLst>
-                              <p:cond delay="0"/>
-                            </p:stCondLst>
-                            <p:childTnLst>
-                              <p:par>
-                                <p:cTn id="13" presetID="1" presetClass="entr" presetSubtype="0" fill="hold" nodeType="clickEffect">
-                                  <p:stCondLst>
-                                    <p:cond delay="0"/>
-                                  </p:stCondLst>
-                                  <p:childTnLst>
-                                    <p:set>
-                                      <p:cBhvr>
-                                        <p:cTn id="14" dur="1" fill="hold">
-                                          <p:stCondLst>
-                                            <p:cond delay="0"/>
-                                          </p:stCondLst>
-                                        </p:cTn>
-                                        <p:tgtEl>
-                                          <p:spTgt spid="8"/>
                                         </p:tgtEl>
                                         <p:attrNameLst>
                                           <p:attrName>style.visibility</p:attrName>
@@ -9280,11 +8457,7 @@
           <a:p>
             <a:r>
               <a:rPr lang="en-US" sz="1600" dirty="0" smtClean="0"/>
-              <a:t>large </a:t>
-            </a:r>
-            <a:r>
-              <a:rPr lang="en-US" sz="1600" dirty="0" smtClean="0"/>
-              <a:t>subset </a:t>
+              <a:t>large subset </a:t>
             </a:r>
             <a:r>
               <a:rPr lang="en-US" sz="1600" dirty="0"/>
@@ -9883,15 +9056,7 @@
             </a:r>
             <a:r>
               <a:rPr lang="en-US" sz="1800" dirty="0" smtClean="0"/>
-              <a:t> et al working </a:t>
-            </a:r>
-            <a:r>
-              <a:rPr lang="en-US" sz="1800" dirty="0" smtClean="0"/>
-              <a:t>on design of F* proof </a:t>
-            </a:r>
-            <a:r>
-              <a:rPr lang="en-US" sz="1800" dirty="0" smtClean="0"/>
-              <a:t>assistant, which combines</a:t>
+              <a:t> et al working on design of F* proof assistant, which combines</a:t>
             </a:r>
             <a:br>
               <a:rPr lang="en-US" sz="1800" dirty="0" smtClean="0"/>
@@ -9908,7 +9073,6 @@
               <a:rPr lang="en-US" sz="1800" dirty="0" smtClean="0"/>
               <a:t>la Coq) with Hoare-style verification (Dijkstra monads)</a:t>
             </a:r>
-            <a:endParaRPr lang="en-US" sz="1800" dirty="0" smtClean="0"/>
           </a:p>
           <a:p>
             <a:pPr>
@@ -9955,7 +9119,6 @@
               <a:rPr lang="en-US" sz="1800" dirty="0" smtClean="0"/>
               <a:t>)</a:t>
             </a:r>
-            <a:endParaRPr lang="en-US" sz="1800" dirty="0" smtClean="0"/>
           </a:p>
           <a:p>
             <a:pPr lvl="1">
@@ -10513,15 +9676,7 @@
             </a:pPr>
             <a:r>
               <a:rPr lang="en-US" sz="2000" dirty="0" smtClean="0"/>
-              <a:t>the obtained guarantees formalized </a:t>
-            </a:r>
-            <a:r>
-              <a:rPr lang="en-US" sz="2000" dirty="0" smtClean="0"/>
-              <a:t>as </a:t>
-            </a:r>
-            <a:r>
-              <a:rPr lang="en-US" sz="2000" dirty="0" smtClean="0"/>
-              <a:t>a variant of </a:t>
+              <a:t>the obtained guarantees formalized as a variant of </a:t>
             </a:r>
             <a:r>
               <a:rPr lang="en-US" sz="2000" u="sng" dirty="0" smtClean="0"/>
@@ -11017,27 +10172,7 @@
           <a:p>
             <a:r>
               <a:rPr lang="en-US" dirty="0" smtClean="0"/>
-              <a:t>14 lectures: first 6.5 </a:t>
-            </a:r>
-            <a:r>
-              <a:rPr lang="en-US" dirty="0" smtClean="0"/>
-              <a:t>by </a:t>
-            </a:r>
-            <a:r>
-              <a:rPr lang="en-US" dirty="0" smtClean="0"/>
-              <a:t>Rob, </a:t>
-            </a:r>
-            <a:r>
-              <a:rPr lang="en-US" dirty="0" smtClean="0"/>
-              <a:t>last </a:t>
-            </a:r>
-            <a:r>
-              <a:rPr lang="en-US" dirty="0" smtClean="0"/>
-              <a:t>6.5 </a:t>
-            </a:r>
-            <a:r>
-              <a:rPr lang="en-US" dirty="0" smtClean="0"/>
-              <a:t>by </a:t>
+              <a:t>14 lectures: first 6.5 by Rob, last 6.5 by </a:t>
             </a:r>
             <a:r>
               <a:rPr lang="en-US" dirty="0"/>
@@ -11056,23 +10191,7 @@
           <a:p>
             <a:r>
               <a:rPr lang="en-US" dirty="0" smtClean="0"/>
-              <a:t>Vacation 21 Dec </a:t>
-            </a:r>
-            <a:r>
-              <a:rPr lang="en-US" dirty="0" smtClean="0"/>
-              <a:t>to </a:t>
-            </a:r>
-            <a:r>
-              <a:rPr lang="en-US" dirty="0" smtClean="0"/>
-              <a:t>8 Jan, </a:t>
-            </a:r>
-            <a:r>
-              <a:rPr lang="en-US" dirty="0" smtClean="0"/>
-              <a:t>so no lecture, no </a:t>
-            </a:r>
-            <a:r>
-              <a:rPr lang="en-US" dirty="0" smtClean="0"/>
-              <a:t>tutorials</a:t>
+              <a:t>Vacation 21 Dec to 8 Jan, so no lecture, no tutorials</a:t>
             </a:r>
           </a:p>
           <a:p>
@@ -11100,12 +10219,11 @@
               <a:rPr lang="en-US" dirty="0" smtClean="0"/>
               <a:t>tutorial</a:t>
             </a:r>
-            <a:endParaRPr lang="en-US" dirty="0" smtClean="0"/>
           </a:p>
           <a:p>
             <a:r>
               <a:rPr lang="en-US" dirty="0" smtClean="0"/>
-              <a:t>Our wish: mostly in-person course</a:t>
+              <a:t>We hope for a mostly in-person course</a:t>
             </a:r>
           </a:p>
           <a:p>
@@ -11136,7 +10254,6 @@
               <a:rPr lang="en-US" dirty="0" smtClean="0"/>
               <a:t>you can use Zoom or watch the recording</a:t>
             </a:r>
-            <a:endParaRPr lang="en-US" dirty="0" smtClean="0"/>
           </a:p>
         </p:txBody>
       </p:sp>
@@ -11436,7 +10553,7 @@
           <a:p>
             <a:r>
               <a:rPr lang="en-US" b="1" dirty="0" smtClean="0"/>
-              <a:t>Exercises</a:t>
+              <a:t>Exercises (same as last semester)</a:t>
             </a:r>
             <a:endParaRPr lang="en-US" b="1" dirty="0"/>
           </a:p>
@@ -11470,40 +10587,9 @@
             </a:r>
           </a:p>
           <a:p>
-            <a:pPr lvl="1"/>
-            <a:r>
-              <a:rPr lang="en-US" sz="1800" dirty="0" smtClean="0"/>
-              <a:t>Coq </a:t>
-            </a:r>
-            <a:r>
-              <a:rPr lang="en-US" sz="1800" dirty="0"/>
-              <a:t>turns </a:t>
-            </a:r>
-            <a:r>
-              <a:rPr lang="en-US" sz="1800" dirty="0" smtClean="0"/>
-              <a:t>proofs </a:t>
-            </a:r>
-            <a:r>
-              <a:rPr lang="en-US" sz="1800" dirty="0"/>
-              <a:t>&amp; logic into </a:t>
-            </a:r>
-            <a:r>
-              <a:rPr lang="en-US" sz="1800" dirty="0" smtClean="0"/>
-              <a:t>programming, and it's fun!</a:t>
-            </a:r>
-          </a:p>
-          <a:p>
             <a:r>
               <a:rPr lang="en-US" sz="2000" b="1" dirty="0" smtClean="0"/>
-              <a:t>New exercise sheet will be </a:t>
-            </a:r>
-            <a:r>
-              <a:rPr lang="en-US" sz="2000" b="1" dirty="0" smtClean="0"/>
-              <a:t>released on Moodle </a:t>
-            </a:r>
-            <a:r>
-              <a:rPr lang="en-US" sz="2000" b="1" dirty="0" smtClean="0"/>
-              <a:t>after most courses</a:t>
+              <a:t>New exercise sheet will be released on Moodle after most courses</a:t>
             </a:r>
           </a:p>
           <a:p>
@@ -11517,19 +10603,7 @@
             <a:pPr lvl="1"/>
             <a:r>
               <a:rPr lang="en-US" sz="1800" dirty="0" smtClean="0"/>
-              <a:t>so there will be </a:t>
-            </a:r>
-            <a:r>
-              <a:rPr lang="en-US" sz="1800" dirty="0" smtClean="0"/>
-              <a:t>10</a:t>
-            </a:r>
-            <a:r>
-              <a:rPr lang="en-US" sz="1800" dirty="0" smtClean="0"/>
-              <a:t>-12 </a:t>
-            </a:r>
-            <a:r>
-              <a:rPr lang="en-US" sz="1800" dirty="0" smtClean="0"/>
-              <a:t>exercise sheets in total</a:t>
+              <a:t>so there will be 10-12 exercise sheets in total</a:t>
             </a:r>
           </a:p>
           <a:p>
@@ -11539,15 +10613,7 @@
             </a:r>
             <a:r>
               <a:rPr lang="en-US" sz="2000" b="1" dirty="0" smtClean="0"/>
-              <a:t>turn in your solution </a:t>
-            </a:r>
-            <a:r>
-              <a:rPr lang="en-US" sz="2000" b="1" dirty="0" smtClean="0"/>
-              <a:t>on Moodle before </a:t>
-            </a:r>
-            <a:r>
-              <a:rPr lang="en-US" sz="2000" b="1" dirty="0" smtClean="0"/>
-              <a:t>next course</a:t>
+              <a:t>turn in your solution on Moodle before next course</a:t>
             </a:r>
           </a:p>
           <a:p>
@@ -11575,11 +10641,7 @@
             <a:pPr lvl="1"/>
             <a:r>
               <a:rPr lang="en-US" sz="2000" dirty="0" smtClean="0"/>
-              <a:t>not </a:t>
-            </a:r>
-            <a:r>
-              <a:rPr lang="en-US" sz="2000" dirty="0" smtClean="0"/>
-              <a:t>required to do the optional exercises; they don't count for grade</a:t>
+              <a:t>not required to do the optional exercises; they don't count for grade</a:t>
             </a:r>
           </a:p>
           <a:p>
@@ -11632,399 +10694,7 @@
   <p:timing>
     <p:tnLst>
       <p:par>
-        <p:cTn id="1" dur="indefinite" restart="never" nodeType="tmRoot">
-          <p:childTnLst>
-            <p:seq concurrent="1" nextAc="seek">
-              <p:cTn id="2" dur="indefinite" nodeType="mainSeq">
-                <p:childTnLst>
-                  <p:par>
-                    <p:cTn id="3" fill="hold">
-                      <p:stCondLst>
-                        <p:cond delay="indefinite"/>
-                      </p:stCondLst>
-                      <p:childTnLst>
-                        <p:par>
-                          <p:cTn id="4" fill="hold">
-                            <p:stCondLst>
-                              <p:cond delay="0"/>
-                            </p:stCondLst>
-                            <p:childTnLst>
-                              <p:par>
-                                <p:cTn id="5" presetID="1" presetClass="entr" presetSubtype="0" fill="hold" nodeType="clickEffect">
-                                  <p:stCondLst>
-                                    <p:cond delay="0"/>
-                                  </p:stCondLst>
-                                  <p:childTnLst>
-                                    <p:set>
-                                      <p:cBhvr>
-                                        <p:cTn id="6" dur="1" fill="hold">
-                                          <p:stCondLst>
-                                            <p:cond delay="0"/>
-                                          </p:stCondLst>
-                                        </p:cTn>
-                                        <p:tgtEl>
-                                          <p:spTgt spid="3">
-                                            <p:txEl>
-                                              <p:pRg st="2" end="2"/>
-                                            </p:txEl>
-                                          </p:spTgt>
-                                        </p:tgtEl>
-                                        <p:attrNameLst>
-                                          <p:attrName>style.visibility</p:attrName>
-                                        </p:attrNameLst>
-                                      </p:cBhvr>
-                                      <p:to>
-                                        <p:strVal val="visible"/>
-                                      </p:to>
-                                    </p:set>
-                                  </p:childTnLst>
-                                </p:cTn>
-                              </p:par>
-                              <p:par>
-                                <p:cTn id="7" presetID="1" presetClass="entr" presetSubtype="0" fill="hold" nodeType="withEffect">
-                                  <p:stCondLst>
-                                    <p:cond delay="0"/>
-                                  </p:stCondLst>
-                                  <p:childTnLst>
-                                    <p:set>
-                                      <p:cBhvr>
-                                        <p:cTn id="8" dur="1" fill="hold">
-                                          <p:stCondLst>
-                                            <p:cond delay="0"/>
-                                          </p:stCondLst>
-                                        </p:cTn>
-                                        <p:tgtEl>
-                                          <p:spTgt spid="3">
-                                            <p:txEl>
-                                              <p:pRg st="3" end="3"/>
-                                            </p:txEl>
-                                          </p:spTgt>
-                                        </p:tgtEl>
-                                        <p:attrNameLst>
-                                          <p:attrName>style.visibility</p:attrName>
-                                        </p:attrNameLst>
-                                      </p:cBhvr>
-                                      <p:to>
-                                        <p:strVal val="visible"/>
-                                      </p:to>
-                                    </p:set>
-                                  </p:childTnLst>
-                                </p:cTn>
-                              </p:par>
-                              <p:par>
-                                <p:cTn id="9" presetID="1" presetClass="entr" presetSubtype="0" fill="hold" nodeType="withEffect">
-                                  <p:stCondLst>
-                                    <p:cond delay="0"/>
-                                  </p:stCondLst>
-                                  <p:childTnLst>
-                                    <p:set>
-                                      <p:cBhvr>
-                                        <p:cTn id="10" dur="1" fill="hold">
-                                          <p:stCondLst>
-                                            <p:cond delay="0"/>
-                                          </p:stCondLst>
-                                        </p:cTn>
-                                        <p:tgtEl>
-                                          <p:spTgt spid="3">
-                                            <p:txEl>
-                                              <p:pRg st="4" end="4"/>
-                                            </p:txEl>
-                                          </p:spTgt>
-                                        </p:tgtEl>
-                                        <p:attrNameLst>
-                                          <p:attrName>style.visibility</p:attrName>
-                                        </p:attrNameLst>
-                                      </p:cBhvr>
-                                      <p:to>
-                                        <p:strVal val="visible"/>
-                                      </p:to>
-                                    </p:set>
-                                  </p:childTnLst>
-                                </p:cTn>
-                              </p:par>
-                            </p:childTnLst>
-                          </p:cTn>
-                        </p:par>
-                      </p:childTnLst>
-                    </p:cTn>
-                  </p:par>
-                  <p:par>
-                    <p:cTn id="11" fill="hold">
-                      <p:stCondLst>
-                        <p:cond delay="indefinite"/>
-                      </p:stCondLst>
-                      <p:childTnLst>
-                        <p:par>
-                          <p:cTn id="12" fill="hold">
-                            <p:stCondLst>
-                              <p:cond delay="0"/>
-                            </p:stCondLst>
-                            <p:childTnLst>
-                              <p:par>
-                                <p:cTn id="13" presetID="1" presetClass="entr" presetSubtype="0" fill="hold" nodeType="clickEffect">
-                                  <p:stCondLst>
-                                    <p:cond delay="0"/>
-                                  </p:stCondLst>
-                                  <p:childTnLst>
-                                    <p:set>
-                                      <p:cBhvr>
-                                        <p:cTn id="14" dur="1" fill="hold">
-                                          <p:stCondLst>
-                                            <p:cond delay="0"/>
-                                          </p:stCondLst>
-                                        </p:cTn>
-                                        <p:tgtEl>
-                                          <p:spTgt spid="3">
-                                            <p:txEl>
-                                              <p:pRg st="5" end="5"/>
-                                            </p:txEl>
-                                          </p:spTgt>
-                                        </p:tgtEl>
-                                        <p:attrNameLst>
-                                          <p:attrName>style.visibility</p:attrName>
-                                        </p:attrNameLst>
-                                      </p:cBhvr>
-                                      <p:to>
-                                        <p:strVal val="visible"/>
-                                      </p:to>
-                                    </p:set>
-                                  </p:childTnLst>
-                                </p:cTn>
-                              </p:par>
-                              <p:par>
-                                <p:cTn id="15" presetID="1" presetClass="entr" presetSubtype="0" fill="hold" nodeType="withEffect">
-                                  <p:stCondLst>
-                                    <p:cond delay="0"/>
-                                  </p:stCondLst>
-                                  <p:childTnLst>
-                                    <p:set>
-                                      <p:cBhvr>
-                                        <p:cTn id="16" dur="1" fill="hold">
-                                          <p:stCondLst>
-                                            <p:cond delay="0"/>
-                                          </p:stCondLst>
-                                        </p:cTn>
-                                        <p:tgtEl>
-                                          <p:spTgt spid="3">
-                                            <p:txEl>
-                                              <p:pRg st="6" end="6"/>
-                                            </p:txEl>
-                                          </p:spTgt>
-                                        </p:tgtEl>
-                                        <p:attrNameLst>
-                                          <p:attrName>style.visibility</p:attrName>
-                                        </p:attrNameLst>
-                                      </p:cBhvr>
-                                      <p:to>
-                                        <p:strVal val="visible"/>
-                                      </p:to>
-                                    </p:set>
-                                  </p:childTnLst>
-                                </p:cTn>
-                              </p:par>
-                            </p:childTnLst>
-                          </p:cTn>
-                        </p:par>
-                      </p:childTnLst>
-                    </p:cTn>
-                  </p:par>
-                  <p:par>
-                    <p:cTn id="17" fill="hold">
-                      <p:stCondLst>
-                        <p:cond delay="indefinite"/>
-                      </p:stCondLst>
-                      <p:childTnLst>
-                        <p:par>
-                          <p:cTn id="18" fill="hold">
-                            <p:stCondLst>
-                              <p:cond delay="0"/>
-                            </p:stCondLst>
-                            <p:childTnLst>
-                              <p:par>
-                                <p:cTn id="19" presetID="1" presetClass="entr" presetSubtype="0" fill="hold" nodeType="clickEffect">
-                                  <p:stCondLst>
-                                    <p:cond delay="0"/>
-                                  </p:stCondLst>
-                                  <p:childTnLst>
-                                    <p:set>
-                                      <p:cBhvr>
-                                        <p:cTn id="20" dur="1" fill="hold">
-                                          <p:stCondLst>
-                                            <p:cond delay="0"/>
-                                          </p:stCondLst>
-                                        </p:cTn>
-                                        <p:tgtEl>
-                                          <p:spTgt spid="3">
-                                            <p:txEl>
-                                              <p:pRg st="7" end="7"/>
-                                            </p:txEl>
-                                          </p:spTgt>
-                                        </p:tgtEl>
-                                        <p:attrNameLst>
-                                          <p:attrName>style.visibility</p:attrName>
-                                        </p:attrNameLst>
-                                      </p:cBhvr>
-                                      <p:to>
-                                        <p:strVal val="visible"/>
-                                      </p:to>
-                                    </p:set>
-                                  </p:childTnLst>
-                                </p:cTn>
-                              </p:par>
-                              <p:par>
-                                <p:cTn id="21" presetID="1" presetClass="entr" presetSubtype="0" fill="hold" nodeType="withEffect">
-                                  <p:stCondLst>
-                                    <p:cond delay="0"/>
-                                  </p:stCondLst>
-                                  <p:childTnLst>
-                                    <p:set>
-                                      <p:cBhvr>
-                                        <p:cTn id="22" dur="1" fill="hold">
-                                          <p:stCondLst>
-                                            <p:cond delay="0"/>
-                                          </p:stCondLst>
-                                        </p:cTn>
-                                        <p:tgtEl>
-                                          <p:spTgt spid="3">
-                                            <p:txEl>
-                                              <p:pRg st="8" end="8"/>
-                                            </p:txEl>
-                                          </p:spTgt>
-                                        </p:tgtEl>
-                                        <p:attrNameLst>
-                                          <p:attrName>style.visibility</p:attrName>
-                                        </p:attrNameLst>
-                                      </p:cBhvr>
-                                      <p:to>
-                                        <p:strVal val="visible"/>
-                                      </p:to>
-                                    </p:set>
-                                  </p:childTnLst>
-                                </p:cTn>
-                              </p:par>
-                            </p:childTnLst>
-                          </p:cTn>
-                        </p:par>
-                      </p:childTnLst>
-                    </p:cTn>
-                  </p:par>
-                  <p:par>
-                    <p:cTn id="23" fill="hold">
-                      <p:stCondLst>
-                        <p:cond delay="indefinite"/>
-                      </p:stCondLst>
-                      <p:childTnLst>
-                        <p:par>
-                          <p:cTn id="24" fill="hold">
-                            <p:stCondLst>
-                              <p:cond delay="0"/>
-                            </p:stCondLst>
-                            <p:childTnLst>
-                              <p:par>
-                                <p:cTn id="25" presetID="1" presetClass="entr" presetSubtype="0" fill="hold" nodeType="clickEffect">
-                                  <p:stCondLst>
-                                    <p:cond delay="0"/>
-                                  </p:stCondLst>
-                                  <p:childTnLst>
-                                    <p:set>
-                                      <p:cBhvr>
-                                        <p:cTn id="26" dur="1" fill="hold">
-                                          <p:stCondLst>
-                                            <p:cond delay="0"/>
-                                          </p:stCondLst>
-                                        </p:cTn>
-                                        <p:tgtEl>
-                                          <p:spTgt spid="3">
-                                            <p:txEl>
-                                              <p:pRg st="9" end="9"/>
-                                            </p:txEl>
-                                          </p:spTgt>
-                                        </p:tgtEl>
-                                        <p:attrNameLst>
-                                          <p:attrName>style.visibility</p:attrName>
-                                        </p:attrNameLst>
-                                      </p:cBhvr>
-                                      <p:to>
-                                        <p:strVal val="visible"/>
-                                      </p:to>
-                                    </p:set>
-                                  </p:childTnLst>
-                                </p:cTn>
-                              </p:par>
-                            </p:childTnLst>
-                          </p:cTn>
-                        </p:par>
-                      </p:childTnLst>
-                    </p:cTn>
-                  </p:par>
-                  <p:par>
-                    <p:cTn id="27" fill="hold">
-                      <p:stCondLst>
-                        <p:cond delay="indefinite"/>
-                      </p:stCondLst>
-                      <p:childTnLst>
-                        <p:par>
-                          <p:cTn id="28" fill="hold">
-                            <p:stCondLst>
-                              <p:cond delay="0"/>
-                            </p:stCondLst>
-                            <p:childTnLst>
-                              <p:par>
-                                <p:cTn id="29" presetID="1" presetClass="entr" presetSubtype="0" fill="hold" nodeType="clickEffect">
-                                  <p:stCondLst>
-                                    <p:cond delay="0"/>
-                                  </p:stCondLst>
-                                  <p:childTnLst>
-                                    <p:set>
-                                      <p:cBhvr>
-                                        <p:cTn id="30" dur="1" fill="hold">
-                                          <p:stCondLst>
-                                            <p:cond delay="0"/>
-                                          </p:stCondLst>
-                                        </p:cTn>
-                                        <p:tgtEl>
-                                          <p:spTgt spid="3">
-                                            <p:txEl>
-                                              <p:pRg st="10" end="10"/>
-                                            </p:txEl>
-                                          </p:spTgt>
-                                        </p:tgtEl>
-                                        <p:attrNameLst>
-                                          <p:attrName>style.visibility</p:attrName>
-                                        </p:attrNameLst>
-                                      </p:cBhvr>
-                                      <p:to>
-                                        <p:strVal val="visible"/>
-                                      </p:to>
-                                    </p:set>
-                                  </p:childTnLst>
-                                </p:cTn>
-                              </p:par>
-                            </p:childTnLst>
-                          </p:cTn>
-                        </p:par>
-                      </p:childTnLst>
-                    </p:cTn>
-                  </p:par>
-                </p:childTnLst>
-              </p:cTn>
-              <p:prevCondLst>
-                <p:cond evt="onPrev" delay="0">
-                  <p:tgtEl>
-                    <p:sldTgt/>
-                  </p:tgtEl>
-                </p:cond>
-              </p:prevCondLst>
-              <p:nextCondLst>
-                <p:cond evt="onNext" delay="0">
-                  <p:tgtEl>
-                    <p:sldTgt/>
-                  </p:tgtEl>
-                </p:cond>
-              </p:nextCondLst>
-            </p:seq>
-          </p:childTnLst>
-        </p:cTn>
+        <p:cTn id="1" dur="indefinite" restart="never" nodeType="tmRoot"/>
       </p:par>
     </p:tnLst>
   </p:timing>

</xml_diff>